<commit_message>
mejora de ppt 2
</commit_message>
<xml_diff>
--- a/Fase3/Evidencias_Grupales/Presentación Final del Proyecto (Español).pptx
+++ b/Fase3/Evidencias_Grupales/Presentación Final del Proyecto (Español).pptx
@@ -273,7 +273,7 @@
   </p:defaultTextStyle>
   <p:extLst>
     <p:ext uri="GoogleSlidesCustomDataVersion2">
-      <go:slidesCustomData xmlns:go="http://customooxmlschemas.google.com/" r:id="rId28" roundtripDataSignature="AMtx7miR1i9PLjzl2ffVjs/32earnPV7kg=="/>
+      <go:slidesCustomData xmlns:go="http://customooxmlschemas.google.com/" r:id="rId28" roundtripDataSignature="AMtx7mjth/UFxS78zv0PMFN3Waf3bMsYzQ=="/>
     </p:ext>
   </p:extLst>
 </p:presentation>
@@ -8837,7 +8837,7 @@
       </p:cxnSp>
       <p:pic>
         <p:nvPicPr>
-          <p:cNvPr id="183" name="Google Shape;183;p9" title="Untitled.png"/>
+          <p:cNvPr id="183" name="Google Shape;183;p9" title="Untitled (2).png"/>
           <p:cNvPicPr preferRelativeResize="0"/>
           <p:nvPr/>
         </p:nvPicPr>
@@ -8851,8 +8851,8 @@
         </p:blipFill>
         <p:spPr>
           <a:xfrm>
-            <a:off x="152400" y="1576705"/>
-            <a:ext cx="11887201" cy="4923060"/>
+            <a:off x="1400725" y="1565625"/>
+            <a:ext cx="9738575" cy="5128900"/>
           </a:xfrm>
           <a:prstGeom prst="rect">
             <a:avLst/>
@@ -9477,7 +9477,7 @@
                   <a:schemeClr val="dk1"/>
                 </a:solidFill>
               </a:rPr>
-              <a:t>Framwork para facilitar integración con Google Gemini</a:t>
+              <a:t>Framework para facilitar integración con Google Gemini</a:t>
             </a:r>
             <a:endParaRPr sz="1100">
               <a:solidFill>
@@ -10076,8 +10076,8 @@
         </p:nvSpPr>
         <p:spPr>
           <a:xfrm>
-            <a:off x="1" y="1360773"/>
-            <a:ext cx="12191999" cy="769441"/>
+            <a:off x="1" y="1693148"/>
+            <a:ext cx="12192000" cy="769500"/>
           </a:xfrm>
           <a:prstGeom prst="rect">
             <a:avLst/>
@@ -11998,7 +11998,103 @@
                 <a:cs typeface="Calibri"/>
                 <a:sym typeface="Calibri"/>
               </a:rPr>
-              <a:t>Los atletas de deportes de combate deben alcanzar un peso exacto para el pesaje oficial, típicamente 5-7 días antes de la pelea, y luego recuperarlo sin comprometer su rendimiento. </a:t>
+              <a:t>Los </a:t>
+            </a:r>
+            <a:r>
+              <a:rPr b="1" lang="es-MX" sz="1600">
+                <a:solidFill>
+                  <a:schemeClr val="dk1"/>
+                </a:solidFill>
+                <a:latin typeface="Calibri"/>
+                <a:ea typeface="Calibri"/>
+                <a:cs typeface="Calibri"/>
+                <a:sym typeface="Calibri"/>
+              </a:rPr>
+              <a:t>atletas de deportes</a:t>
+            </a:r>
+            <a:r>
+              <a:rPr lang="es-MX" sz="1600">
+                <a:solidFill>
+                  <a:schemeClr val="dk1"/>
+                </a:solidFill>
+                <a:latin typeface="Calibri"/>
+                <a:ea typeface="Calibri"/>
+                <a:cs typeface="Calibri"/>
+                <a:sym typeface="Calibri"/>
+              </a:rPr>
+              <a:t> </a:t>
+            </a:r>
+            <a:r>
+              <a:rPr b="1" lang="es-MX" sz="1600">
+                <a:solidFill>
+                  <a:schemeClr val="dk1"/>
+                </a:solidFill>
+                <a:latin typeface="Calibri"/>
+                <a:ea typeface="Calibri"/>
+                <a:cs typeface="Calibri"/>
+                <a:sym typeface="Calibri"/>
+              </a:rPr>
+              <a:t>de combate</a:t>
+            </a:r>
+            <a:r>
+              <a:rPr lang="es-MX" sz="1600">
+                <a:solidFill>
+                  <a:schemeClr val="dk1"/>
+                </a:solidFill>
+                <a:latin typeface="Calibri"/>
+                <a:ea typeface="Calibri"/>
+                <a:cs typeface="Calibri"/>
+                <a:sym typeface="Calibri"/>
+              </a:rPr>
+              <a:t> deben alcanzar un peso exacto para el pesaje oficial, </a:t>
+            </a:r>
+            <a:r>
+              <a:rPr b="1" lang="es-MX" sz="1600">
+                <a:solidFill>
+                  <a:schemeClr val="dk1"/>
+                </a:solidFill>
+                <a:latin typeface="Calibri"/>
+                <a:ea typeface="Calibri"/>
+                <a:cs typeface="Calibri"/>
+                <a:sym typeface="Calibri"/>
+              </a:rPr>
+              <a:t>típicamente 5-7 días antes</a:t>
+            </a:r>
+            <a:r>
+              <a:rPr lang="es-MX" sz="1600">
+                <a:solidFill>
+                  <a:schemeClr val="dk1"/>
+                </a:solidFill>
+                <a:latin typeface="Calibri"/>
+                <a:ea typeface="Calibri"/>
+                <a:cs typeface="Calibri"/>
+                <a:sym typeface="Calibri"/>
+              </a:rPr>
+              <a:t> </a:t>
+            </a:r>
+            <a:r>
+              <a:rPr b="1" lang="es-MX" sz="1600">
+                <a:solidFill>
+                  <a:schemeClr val="dk1"/>
+                </a:solidFill>
+                <a:latin typeface="Calibri"/>
+                <a:ea typeface="Calibri"/>
+                <a:cs typeface="Calibri"/>
+                <a:sym typeface="Calibri"/>
+              </a:rPr>
+              <a:t>de la pelea</a:t>
+            </a:r>
+            <a:r>
+              <a:rPr lang="es-MX" sz="1600">
+                <a:solidFill>
+                  <a:schemeClr val="dk1"/>
+                </a:solidFill>
+                <a:latin typeface="Calibri"/>
+                <a:ea typeface="Calibri"/>
+                <a:cs typeface="Calibri"/>
+                <a:sym typeface="Calibri"/>
+              </a:rPr>
+              <a:t>, y luego recuperarlo sin comprometer su rendimiento. </a:t>
             </a:r>
             <a:endParaRPr sz="1600">
               <a:solidFill>
@@ -12034,9 +12130,141 @@
                 <a:cs typeface="Calibri"/>
                 <a:sym typeface="Calibri"/>
               </a:rPr>
-              <a:t>Las aplicaciones actuales de nutrición están diseñadas para pérdida de peso gradual y no abordan las necesidades del corte de peso deportivo: carecen de planes con deadlines estrictos, no ofrecen estrategias seguras de corte por fases, y no proporcionan recomendaciones alimentarias adaptadas a cada etapa del proceso. </a:t>
-            </a:r>
-            <a:endParaRPr sz="1800" u="sng">
+              <a:t>Las </a:t>
+            </a:r>
+            <a:r>
+              <a:rPr b="1" lang="es-MX" sz="1600">
+                <a:solidFill>
+                  <a:schemeClr val="dk1"/>
+                </a:solidFill>
+                <a:latin typeface="Calibri"/>
+                <a:ea typeface="Calibri"/>
+                <a:cs typeface="Calibri"/>
+                <a:sym typeface="Calibri"/>
+              </a:rPr>
+              <a:t>aplicaciones actuales</a:t>
+            </a:r>
+            <a:r>
+              <a:rPr lang="es-MX" sz="1600">
+                <a:solidFill>
+                  <a:schemeClr val="dk1"/>
+                </a:solidFill>
+                <a:latin typeface="Calibri"/>
+                <a:ea typeface="Calibri"/>
+                <a:cs typeface="Calibri"/>
+                <a:sym typeface="Calibri"/>
+              </a:rPr>
+              <a:t> de nutrición están diseñadas para </a:t>
+            </a:r>
+            <a:r>
+              <a:rPr b="1" lang="es-MX" sz="1600">
+                <a:solidFill>
+                  <a:schemeClr val="dk1"/>
+                </a:solidFill>
+                <a:latin typeface="Calibri"/>
+                <a:ea typeface="Calibri"/>
+                <a:cs typeface="Calibri"/>
+                <a:sym typeface="Calibri"/>
+              </a:rPr>
+              <a:t>pérdida de peso gradual</a:t>
+            </a:r>
+            <a:r>
+              <a:rPr lang="es-MX" sz="1600">
+                <a:solidFill>
+                  <a:schemeClr val="dk1"/>
+                </a:solidFill>
+                <a:latin typeface="Calibri"/>
+                <a:ea typeface="Calibri"/>
+                <a:cs typeface="Calibri"/>
+                <a:sym typeface="Calibri"/>
+              </a:rPr>
+              <a:t> y </a:t>
+            </a:r>
+            <a:r>
+              <a:rPr b="1" lang="es-MX" sz="1600">
+                <a:solidFill>
+                  <a:schemeClr val="dk1"/>
+                </a:solidFill>
+                <a:latin typeface="Calibri"/>
+                <a:ea typeface="Calibri"/>
+                <a:cs typeface="Calibri"/>
+                <a:sym typeface="Calibri"/>
+              </a:rPr>
+              <a:t>no abordan las necesidades</a:t>
+            </a:r>
+            <a:r>
+              <a:rPr lang="es-MX" sz="1600">
+                <a:solidFill>
+                  <a:schemeClr val="dk1"/>
+                </a:solidFill>
+                <a:latin typeface="Calibri"/>
+                <a:ea typeface="Calibri"/>
+                <a:cs typeface="Calibri"/>
+                <a:sym typeface="Calibri"/>
+              </a:rPr>
+              <a:t> del corte de peso deportivo: </a:t>
+            </a:r>
+            <a:r>
+              <a:rPr b="1" lang="es-MX" sz="1600">
+                <a:solidFill>
+                  <a:schemeClr val="dk1"/>
+                </a:solidFill>
+                <a:latin typeface="Calibri"/>
+                <a:ea typeface="Calibri"/>
+                <a:cs typeface="Calibri"/>
+                <a:sym typeface="Calibri"/>
+              </a:rPr>
+              <a:t>carecen de planes </a:t>
+            </a:r>
+            <a:r>
+              <a:rPr lang="es-MX" sz="1600">
+                <a:solidFill>
+                  <a:schemeClr val="dk1"/>
+                </a:solidFill>
+                <a:latin typeface="Calibri"/>
+                <a:ea typeface="Calibri"/>
+                <a:cs typeface="Calibri"/>
+                <a:sym typeface="Calibri"/>
+              </a:rPr>
+              <a:t>con deadlines estrictos</a:t>
+            </a:r>
+            <a:r>
+              <a:rPr b="1" lang="es-MX" sz="1600">
+                <a:solidFill>
+                  <a:schemeClr val="dk1"/>
+                </a:solidFill>
+                <a:latin typeface="Calibri"/>
+                <a:ea typeface="Calibri"/>
+                <a:cs typeface="Calibri"/>
+                <a:sym typeface="Calibri"/>
+              </a:rPr>
+              <a:t>, no ofrecen estrategias de corte </a:t>
+            </a:r>
+            <a:r>
+              <a:rPr lang="es-MX" sz="1600">
+                <a:solidFill>
+                  <a:schemeClr val="dk1"/>
+                </a:solidFill>
+                <a:latin typeface="Calibri"/>
+                <a:ea typeface="Calibri"/>
+                <a:cs typeface="Calibri"/>
+                <a:sym typeface="Calibri"/>
+              </a:rPr>
+              <a:t>por fases</a:t>
+            </a:r>
+            <a:r>
+              <a:rPr b="1" lang="es-MX" sz="1600">
+                <a:solidFill>
+                  <a:schemeClr val="dk1"/>
+                </a:solidFill>
+                <a:latin typeface="Calibri"/>
+                <a:ea typeface="Calibri"/>
+                <a:cs typeface="Calibri"/>
+                <a:sym typeface="Calibri"/>
+              </a:rPr>
+              <a:t>, y no proporcionan recomendaciones alimentarias adaptadas a cada etapa del proceso. </a:t>
+            </a:r>
+            <a:endParaRPr b="1" sz="1800" u="sng">
               <a:solidFill>
                 <a:schemeClr val="dk1"/>
               </a:solidFill>
@@ -12138,7 +12366,31 @@
                 <a:cs typeface="Calibri"/>
                 <a:sym typeface="Calibri"/>
               </a:rPr>
-              <a:t>una aplicación móvil especializada en corte de peso para atletas de deportes de combate. A diferencia de aplicaciones generales de nutrición, NutriCombat aborda el desafío específico de alcanzar un peso exacto en una fecha determinada para pesajes oficiales.</a:t>
+              <a:t>una aplicación móvil especializada en corte de peso para atletas de deportes de combate. A diferencia de aplicaciones generales de nutrición, </a:t>
+            </a:r>
+            <a:r>
+              <a:rPr b="1" lang="es-MX" sz="1600">
+                <a:solidFill>
+                  <a:schemeClr val="dk1"/>
+                </a:solidFill>
+                <a:latin typeface="Calibri"/>
+                <a:ea typeface="Calibri"/>
+                <a:cs typeface="Calibri"/>
+                <a:sym typeface="Calibri"/>
+              </a:rPr>
+              <a:t>NutriCombat </a:t>
+            </a:r>
+            <a:r>
+              <a:rPr lang="es-MX" sz="1600">
+                <a:solidFill>
+                  <a:schemeClr val="dk1"/>
+                </a:solidFill>
+                <a:latin typeface="Calibri"/>
+                <a:ea typeface="Calibri"/>
+                <a:cs typeface="Calibri"/>
+                <a:sym typeface="Calibri"/>
+              </a:rPr>
+              <a:t>aborda el desafío específico de alcanzar un peso exacto en una fecha determinada para pesajes oficiales.</a:t>
             </a:r>
             <a:endParaRPr sz="1600">
               <a:solidFill>
@@ -12193,9 +12445,117 @@
                 <a:cs typeface="Calibri"/>
                 <a:sym typeface="Calibri"/>
               </a:rPr>
-              <a:t>La aplicación utiliza IA con Google Gemini para calcular calorías mediante fotografías de alimentos, genera planes inteligentes de corte de peso según el tiempo disponible hasta la competencia, y envía alertas personalizadas. Esto permite a los atletas gestionar su peso de manera segura y efectiva, evitando métodos peligrosos que comprometan su rendimiento.</a:t>
-            </a:r>
-            <a:endParaRPr sz="1800">
+              <a:t>La aplicación utiliza IA con </a:t>
+            </a:r>
+            <a:r>
+              <a:rPr b="1" lang="es-MX" sz="1600">
+                <a:solidFill>
+                  <a:schemeClr val="dk1"/>
+                </a:solidFill>
+                <a:latin typeface="Calibri"/>
+                <a:ea typeface="Calibri"/>
+                <a:cs typeface="Calibri"/>
+                <a:sym typeface="Calibri"/>
+              </a:rPr>
+              <a:t>Google Gemini</a:t>
+            </a:r>
+            <a:r>
+              <a:rPr lang="es-MX" sz="1600">
+                <a:solidFill>
+                  <a:schemeClr val="dk1"/>
+                </a:solidFill>
+                <a:latin typeface="Calibri"/>
+                <a:ea typeface="Calibri"/>
+                <a:cs typeface="Calibri"/>
+                <a:sym typeface="Calibri"/>
+              </a:rPr>
+              <a:t> para </a:t>
+            </a:r>
+            <a:r>
+              <a:rPr b="1" lang="es-MX" sz="1600">
+                <a:solidFill>
+                  <a:schemeClr val="dk1"/>
+                </a:solidFill>
+                <a:latin typeface="Calibri"/>
+                <a:ea typeface="Calibri"/>
+                <a:cs typeface="Calibri"/>
+                <a:sym typeface="Calibri"/>
+              </a:rPr>
+              <a:t>calcular calorías mediante fotografías de alimentos</a:t>
+            </a:r>
+            <a:r>
+              <a:rPr lang="es-MX" sz="1600">
+                <a:solidFill>
+                  <a:schemeClr val="dk1"/>
+                </a:solidFill>
+                <a:latin typeface="Calibri"/>
+                <a:ea typeface="Calibri"/>
+                <a:cs typeface="Calibri"/>
+                <a:sym typeface="Calibri"/>
+              </a:rPr>
+              <a:t>, </a:t>
+            </a:r>
+            <a:r>
+              <a:rPr b="1" lang="es-MX" sz="1600">
+                <a:solidFill>
+                  <a:schemeClr val="dk1"/>
+                </a:solidFill>
+                <a:latin typeface="Calibri"/>
+                <a:ea typeface="Calibri"/>
+                <a:cs typeface="Calibri"/>
+                <a:sym typeface="Calibri"/>
+              </a:rPr>
+              <a:t>genera planes inteligentes de corte de peso según</a:t>
+            </a:r>
+            <a:r>
+              <a:rPr lang="es-MX" sz="1600">
+                <a:solidFill>
+                  <a:schemeClr val="dk1"/>
+                </a:solidFill>
+                <a:latin typeface="Calibri"/>
+                <a:ea typeface="Calibri"/>
+                <a:cs typeface="Calibri"/>
+                <a:sym typeface="Calibri"/>
+              </a:rPr>
+              <a:t> el tiempo disponible hasta la competencia, y </a:t>
+            </a:r>
+            <a:r>
+              <a:rPr b="1" lang="es-MX" sz="1600">
+                <a:solidFill>
+                  <a:schemeClr val="dk1"/>
+                </a:solidFill>
+                <a:latin typeface="Calibri"/>
+                <a:ea typeface="Calibri"/>
+                <a:cs typeface="Calibri"/>
+                <a:sym typeface="Calibri"/>
+              </a:rPr>
+              <a:t>envía alertas personalizadas</a:t>
+            </a:r>
+            <a:r>
+              <a:rPr lang="es-MX" sz="1600">
+                <a:solidFill>
+                  <a:schemeClr val="dk1"/>
+                </a:solidFill>
+                <a:latin typeface="Calibri"/>
+                <a:ea typeface="Calibri"/>
+                <a:cs typeface="Calibri"/>
+                <a:sym typeface="Calibri"/>
+              </a:rPr>
+              <a:t>. Esto permite a los atletas gestionar su peso de </a:t>
+            </a:r>
+            <a:r>
+              <a:rPr b="1" lang="es-MX" sz="1600">
+                <a:solidFill>
+                  <a:schemeClr val="dk1"/>
+                </a:solidFill>
+                <a:latin typeface="Calibri"/>
+                <a:ea typeface="Calibri"/>
+                <a:cs typeface="Calibri"/>
+                <a:sym typeface="Calibri"/>
+              </a:rPr>
+              <a:t>manera segura y efectiva, evitando métodos peligrosos que comprometan su rendimiento.</a:t>
+            </a:r>
+            <a:endParaRPr b="1" sz="1800">
               <a:solidFill>
                 <a:schemeClr val="dk1"/>
               </a:solidFill>
@@ -12766,7 +13126,7 @@
                 <a:cs typeface="Calibri"/>
                 <a:sym typeface="Calibri"/>
               </a:rPr>
-              <a:t>Desarrollar una aplicación móvil que facilite el seguimiento nutricional mediante inteligencia artificial, motivando a los usuarios a mantener hábitos alimenticios saludables a través de mecánicas de juego y análisis personalizado de su progreso, incorporando además la función de semana de corte de peso para apoyar objetivos específicos de control y reducción de peso.</a:t>
+              <a:t>Desarrollar una aplicación móvil que facilite el seguimiento nutricional mediante inteligencia artificial, proporcionando a los atletas de deportes de combate planes personalizados de corte de peso, dashboard con métricas en tiempo real, y retroalimentación inteligente basada en sus objetivos y progreso diario.</a:t>
             </a:r>
             <a:endParaRPr sz="1800">
               <a:solidFill>
@@ -12834,15 +13194,43 @@
                   <a:schemeClr val="dk1"/>
                 </a:solidFill>
               </a:rPr>
-              <a:t>Integrar Google Gemini API para identificación automática de alimentos por </a:t>
-            </a:r>
+              <a:t>Implementar sistema de reconocimiento automático de alimentos</a:t>
+            </a:r>
+            <a:r>
+              <a:rPr lang="es-MX" sz="1300">
+                <a:solidFill>
+                  <a:schemeClr val="dk1"/>
+                </a:solidFill>
+              </a:rPr>
+              <a:t> mediante Google Gemini API para simplificar el registro nutricional diario</a:t>
+            </a:r>
+            <a:endParaRPr sz="1300">
+              <a:solidFill>
+                <a:schemeClr val="dk1"/>
+              </a:solidFill>
+            </a:endParaRPr>
+          </a:p>
+          <a:p>
+            <a:pPr indent="-311150" lvl="0" marL="457200" rtl="0" algn="l">
+              <a:spcBef>
+                <a:spcPts val="0"/>
+              </a:spcBef>
+              <a:spcAft>
+                <a:spcPts val="0"/>
+              </a:spcAft>
+              <a:buClr>
+                <a:schemeClr val="dk1"/>
+              </a:buClr>
+              <a:buSzPts val="1300"/>
+              <a:buChar char="●"/>
+            </a:pPr>
             <a:r>
               <a:rPr b="1" lang="es-MX" sz="1300">
                 <a:solidFill>
                   <a:schemeClr val="dk1"/>
                 </a:solidFill>
               </a:rPr>
-              <a:t>imágenes</a:t>
+              <a:t>Integrar inteligencia artificial para generar planes de corte de peso personalizados según peso objetivo, fecha de competencia y perfil del atleta</a:t>
             </a:r>
             <a:endParaRPr b="1" sz="1300">
               <a:solidFill>
@@ -12870,9 +13258,17 @@
                   <a:schemeClr val="dk1"/>
                 </a:solidFill>
               </a:rPr>
-              <a:t>Construir interfaz visual con métricas nutricionales en tiempo real</a:t>
-            </a:r>
-            <a:endParaRPr b="1" sz="1300">
+              <a:t>Crear dashboard interactivo que visualice métricas clave del progreso nutricional </a:t>
+            </a:r>
+            <a:r>
+              <a:rPr lang="es-MX" sz="1300">
+                <a:solidFill>
+                  <a:schemeClr val="dk1"/>
+                </a:solidFill>
+              </a:rPr>
+              <a:t>y alerta al usuario según proximidad a la competencia</a:t>
+            </a:r>
+            <a:endParaRPr sz="1300">
               <a:solidFill>
                 <a:schemeClr val="dk1"/>
               </a:solidFill>
@@ -12898,53 +13294,17 @@
                   <a:schemeClr val="dk1"/>
                 </a:solidFill>
               </a:rPr>
-              <a:t>Crear sistema de planes de corte de peso  y recomendaciones basadas en </a:t>
-            </a:r>
-            <a:r>
-              <a:rPr b="1" lang="es-MX" sz="1300">
+              <a:t>Desarrollar aplicación móvil multiplataforma con arquitectura serverless</a:t>
+            </a:r>
+            <a:r>
+              <a:rPr lang="es-MX" sz="1300">
                 <a:solidFill>
                   <a:schemeClr val="dk1"/>
                 </a:solidFill>
               </a:rPr>
-              <a:t>alimentación</a:t>
-            </a:r>
-            <a:r>
-              <a:rPr b="1" lang="es-MX" sz="1300">
-                <a:solidFill>
-                  <a:schemeClr val="dk1"/>
-                </a:solidFill>
-              </a:rPr>
-              <a:t> de usuario</a:t>
-            </a:r>
-            <a:endParaRPr b="1" sz="1300">
-              <a:solidFill>
-                <a:schemeClr val="dk1"/>
-              </a:solidFill>
-            </a:endParaRPr>
-          </a:p>
-          <a:p>
-            <a:pPr indent="-311150" lvl="0" marL="457200" rtl="0" algn="l">
-              <a:spcBef>
-                <a:spcPts val="0"/>
-              </a:spcBef>
-              <a:spcAft>
-                <a:spcPts val="0"/>
-              </a:spcAft>
-              <a:buClr>
-                <a:schemeClr val="dk1"/>
-              </a:buClr>
-              <a:buSzPts val="1300"/>
-              <a:buChar char="●"/>
-            </a:pPr>
-            <a:r>
-              <a:rPr b="1" lang="es-MX" sz="1300">
-                <a:solidFill>
-                  <a:schemeClr val="dk1"/>
-                </a:solidFill>
-              </a:rPr>
-              <a:t>Implementar aplicación nativa multiplataforma con alta performance</a:t>
-            </a:r>
-            <a:endParaRPr b="1" sz="1300">
+              <a:t> que garantice disponibilidad, eficiencia y rendimiento</a:t>
+            </a:r>
+            <a:endParaRPr sz="1300">
               <a:solidFill>
                 <a:schemeClr val="dk1"/>
               </a:solidFill>
@@ -15127,8 +15487,8 @@
         </p:blipFill>
         <p:spPr>
           <a:xfrm>
-            <a:off x="152400" y="2379050"/>
-            <a:ext cx="11185572" cy="4326549"/>
+            <a:off x="360788" y="2295225"/>
+            <a:ext cx="11218028" cy="4326551"/>
           </a:xfrm>
           <a:prstGeom prst="rect">
             <a:avLst/>
@@ -15416,7 +15776,7 @@
         <p:spPr>
           <a:xfrm>
             <a:off x="152400" y="2379050"/>
-            <a:ext cx="11887201" cy="3598664"/>
+            <a:ext cx="11887200" cy="3588589"/>
           </a:xfrm>
           <a:prstGeom prst="rect">
             <a:avLst/>

</xml_diff>

<commit_message>
mejora de descripcion integrantes
</commit_message>
<xml_diff>
--- a/Fase3/Evidencias_Grupales/Presentación Final del Proyecto (Español).pptx
+++ b/Fase3/Evidencias_Grupales/Presentación Final del Proyecto (Español).pptx
@@ -10445,9 +10445,9 @@
         <p:grpSpPr>
           <a:xfrm>
             <a:off x="4085625" y="781675"/>
-            <a:ext cx="7633500" cy="2747730"/>
-            <a:chOff x="4085625" y="814925"/>
-            <a:chExt cx="7633500" cy="3175098"/>
+            <a:ext cx="7633500" cy="2747731"/>
+            <a:chOff x="4085625" y="814924"/>
+            <a:chExt cx="7633500" cy="3175099"/>
           </a:xfrm>
         </p:grpSpPr>
         <p:sp>
@@ -10521,8 +10521,8 @@
           </p:nvSpPr>
           <p:spPr>
             <a:xfrm>
-              <a:off x="5680300" y="814925"/>
-              <a:ext cx="5970900" cy="1611600"/>
+              <a:off x="5680300" y="814924"/>
+              <a:ext cx="5970900" cy="2728200"/>
             </a:xfrm>
             <a:prstGeom prst="rect">
               <a:avLst/>
@@ -10556,7 +10556,7 @@
                 <a:buNone/>
               </a:pPr>
               <a:r>
-                <a:rPr lang="es-MX" sz="2300">
+                <a:rPr lang="es-MX" sz="2900">
                   <a:solidFill>
                     <a:schemeClr val="lt1"/>
                   </a:solidFill>
@@ -10567,7 +10567,7 @@
                 </a:rPr>
                 <a:t>Fabián Muñoz</a:t>
               </a:r>
-              <a:endParaRPr b="0" i="0" sz="2300" u="none" cap="none" strike="noStrike">
+              <a:endParaRPr b="0" i="0" sz="2900" u="none" cap="none" strike="noStrike">
                 <a:solidFill>
                   <a:schemeClr val="lt1"/>
                 </a:solidFill>
@@ -10578,71 +10578,7 @@
               </a:endParaRPr>
             </a:p>
             <a:p>
-              <a:pPr indent="-184150" lvl="1" marL="228600" marR="0" rtl="0" algn="l">
-                <a:lnSpc>
-                  <a:spcPct val="90000"/>
-                </a:lnSpc>
-                <a:spcBef>
-                  <a:spcPts val="910"/>
-                </a:spcBef>
-                <a:spcAft>
-                  <a:spcPts val="0"/>
-                </a:spcAft>
-                <a:buClr>
-                  <a:schemeClr val="lt1"/>
-                </a:buClr>
-                <a:buSzPts val="1300"/>
-                <a:buFont typeface="Calibri"/>
-                <a:buChar char="•"/>
-              </a:pPr>
-              <a:r>
-                <a:rPr lang="es-MX" sz="1300">
-                  <a:solidFill>
-                    <a:schemeClr val="lt1"/>
-                  </a:solidFill>
-                  <a:latin typeface="Calibri"/>
-                  <a:ea typeface="Calibri"/>
-                  <a:cs typeface="Calibri"/>
-                  <a:sym typeface="Calibri"/>
-                </a:rPr>
-                <a:t>Full Stack </a:t>
-              </a:r>
-              <a:r>
-                <a:rPr lang="es-MX" sz="1300">
-                  <a:solidFill>
-                    <a:schemeClr val="lt1"/>
-                  </a:solidFill>
-                  <a:latin typeface="Calibri"/>
-                  <a:ea typeface="Calibri"/>
-                  <a:cs typeface="Calibri"/>
-                  <a:sym typeface="Calibri"/>
-                </a:rPr>
-                <a:t>Developer (</a:t>
-              </a:r>
-              <a:r>
-                <a:rPr lang="es-MX" sz="1300">
-                  <a:solidFill>
-                    <a:schemeClr val="lt1"/>
-                  </a:solidFill>
-                  <a:latin typeface="Calibri"/>
-                  <a:ea typeface="Calibri"/>
-                  <a:cs typeface="Calibri"/>
-                  <a:sym typeface="Calibri"/>
-                </a:rPr>
-                <a:t>Frontend Focus)</a:t>
-              </a:r>
-              <a:endParaRPr sz="1300">
-                <a:solidFill>
-                  <a:schemeClr val="lt1"/>
-                </a:solidFill>
-                <a:latin typeface="Calibri"/>
-                <a:ea typeface="Calibri"/>
-                <a:cs typeface="Calibri"/>
-                <a:sym typeface="Calibri"/>
-              </a:endParaRPr>
-            </a:p>
-            <a:p>
-              <a:pPr indent="-311150" lvl="0" marL="457200" rtl="0" algn="l">
+              <a:pPr indent="-349250" lvl="0" marL="457200" rtl="0" algn="l">
                 <a:lnSpc>
                   <a:spcPct val="90000"/>
                 </a:lnSpc>
@@ -10655,12 +10591,12 @@
                 <a:buClr>
                   <a:schemeClr val="lt1"/>
                 </a:buClr>
-                <a:buSzPts val="1300"/>
+                <a:buSzPts val="1900"/>
                 <a:buFont typeface="Calibri"/>
                 <a:buChar char="●"/>
               </a:pPr>
               <a:r>
-                <a:rPr lang="es-MX" sz="1300">
+                <a:rPr lang="es-MX" sz="1900">
                   <a:solidFill>
                     <a:schemeClr val="lt1"/>
                   </a:solidFill>
@@ -10669,9 +10605,9 @@
                   <a:cs typeface="Calibri"/>
                   <a:sym typeface="Calibri"/>
                 </a:rPr>
-                <a:t>Funciones desempeñadas:</a:t>
+                <a:t>Full Stack Developer (Frontend Focus)</a:t>
               </a:r>
-              <a:endParaRPr sz="1300">
+              <a:endParaRPr sz="1900">
                 <a:solidFill>
                   <a:schemeClr val="lt1"/>
                 </a:solidFill>
@@ -10682,7 +10618,127 @@
               </a:endParaRPr>
             </a:p>
             <a:p>
-              <a:pPr indent="-311150" lvl="1" marL="914400" rtl="0" algn="l">
+              <a:pPr indent="-349250" lvl="0" marL="457200" rtl="0" algn="l">
+                <a:lnSpc>
+                  <a:spcPct val="90000"/>
+                </a:lnSpc>
+                <a:spcBef>
+                  <a:spcPts val="0"/>
+                </a:spcBef>
+                <a:spcAft>
+                  <a:spcPts val="0"/>
+                </a:spcAft>
+                <a:buClr>
+                  <a:schemeClr val="lt1"/>
+                </a:buClr>
+                <a:buSzPts val="1900"/>
+                <a:buFont typeface="Calibri"/>
+                <a:buChar char="●"/>
+              </a:pPr>
+              <a:r>
+                <a:rPr lang="es-MX" sz="1900">
+                  <a:solidFill>
+                    <a:schemeClr val="lt1"/>
+                  </a:solidFill>
+                  <a:latin typeface="Calibri"/>
+                  <a:ea typeface="Calibri"/>
+                  <a:cs typeface="Calibri"/>
+                  <a:sym typeface="Calibri"/>
+                </a:rPr>
+                <a:t>Desarrollo frontend móvil con React Native</a:t>
+              </a:r>
+              <a:endParaRPr sz="1900">
+                <a:solidFill>
+                  <a:schemeClr val="lt1"/>
+                </a:solidFill>
+                <a:latin typeface="Calibri"/>
+                <a:ea typeface="Calibri"/>
+                <a:cs typeface="Calibri"/>
+                <a:sym typeface="Calibri"/>
+              </a:endParaRPr>
+            </a:p>
+            <a:p>
+              <a:pPr indent="-349250" lvl="0" marL="457200" rtl="0" algn="l">
+                <a:lnSpc>
+                  <a:spcPct val="90000"/>
+                </a:lnSpc>
+                <a:spcBef>
+                  <a:spcPts val="0"/>
+                </a:spcBef>
+                <a:spcAft>
+                  <a:spcPts val="0"/>
+                </a:spcAft>
+                <a:buClr>
+                  <a:schemeClr val="lt1"/>
+                </a:buClr>
+                <a:buSzPts val="1900"/>
+                <a:buFont typeface="Calibri"/>
+                <a:buChar char="●"/>
+              </a:pPr>
+              <a:r>
+                <a:rPr lang="es-MX" sz="1900">
+                  <a:solidFill>
+                    <a:schemeClr val="lt1"/>
+                  </a:solidFill>
+                  <a:latin typeface="Calibri"/>
+                  <a:ea typeface="Calibri"/>
+                  <a:cs typeface="Calibri"/>
+                  <a:sym typeface="Calibri"/>
+                </a:rPr>
+                <a:t>Integración Gemini API y diseño UI/UX</a:t>
+              </a:r>
+              <a:endParaRPr sz="1900">
+                <a:solidFill>
+                  <a:schemeClr val="lt1"/>
+                </a:solidFill>
+                <a:latin typeface="Calibri"/>
+                <a:ea typeface="Calibri"/>
+                <a:cs typeface="Calibri"/>
+                <a:sym typeface="Calibri"/>
+              </a:endParaRPr>
+            </a:p>
+            <a:p>
+              <a:pPr indent="-349250" lvl="0" marL="457200" rtl="0" algn="l">
+                <a:lnSpc>
+                  <a:spcPct val="90000"/>
+                </a:lnSpc>
+                <a:spcBef>
+                  <a:spcPts val="0"/>
+                </a:spcBef>
+                <a:spcAft>
+                  <a:spcPts val="0"/>
+                </a:spcAft>
+                <a:buClr>
+                  <a:schemeClr val="lt1"/>
+                </a:buClr>
+                <a:buSzPts val="1900"/>
+                <a:buFont typeface="Calibri"/>
+                <a:buChar char="●"/>
+              </a:pPr>
+              <a:r>
+                <a:rPr lang="es-MX" sz="1900">
+                  <a:solidFill>
+                    <a:schemeClr val="lt1"/>
+                  </a:solidFill>
+                  <a:latin typeface="Calibri"/>
+                  <a:ea typeface="Calibri"/>
+                  <a:cs typeface="Calibri"/>
+                  <a:sym typeface="Calibri"/>
+                </a:rPr>
+                <a:t>Testing, validación de producto y coordinación de sprints</a:t>
+              </a:r>
+              <a:endParaRPr sz="1900">
+                <a:solidFill>
+                  <a:schemeClr val="lt1"/>
+                </a:solidFill>
+                <a:latin typeface="Calibri"/>
+                <a:ea typeface="Calibri"/>
+                <a:cs typeface="Calibri"/>
+                <a:sym typeface="Calibri"/>
+              </a:endParaRPr>
+            </a:p>
+            <a:p>
+              <a:pPr indent="0" lvl="0" marL="0" rtl="0" algn="l">
                 <a:lnSpc>
                   <a:spcPct val="90000"/>
                 </a:lnSpc>
@@ -10692,266 +10748,12 @@
                 <a:spcAft>
                   <a:spcPts val="0"/>
                 </a:spcAft>
-                <a:buClr>
-                  <a:schemeClr val="lt1"/>
-                </a:buClr>
-                <a:buSzPts val="1300"/>
-                <a:buFont typeface="Calibri"/>
-                <a:buChar char="•"/>
+                <a:buNone/>
               </a:pPr>
               <a:r>
-                <a:rPr lang="es-MX" sz="1300">
-                  <a:solidFill>
-                    <a:schemeClr val="lt1"/>
-                  </a:solidFill>
-                  <a:latin typeface="Calibri"/>
-                  <a:ea typeface="Calibri"/>
-                  <a:cs typeface="Calibri"/>
-                  <a:sym typeface="Calibri"/>
-                </a:rPr>
-                <a:t>Desarrollo frontend móvil (React Native)</a:t>
+                <a:t/>
               </a:r>
-              <a:endParaRPr sz="1300">
-                <a:solidFill>
-                  <a:schemeClr val="lt1"/>
-                </a:solidFill>
-                <a:latin typeface="Calibri"/>
-                <a:ea typeface="Calibri"/>
-                <a:cs typeface="Calibri"/>
-                <a:sym typeface="Calibri"/>
-              </a:endParaRPr>
-            </a:p>
-            <a:p>
-              <a:pPr indent="-311150" lvl="1" marL="914400" rtl="0" algn="l">
-                <a:lnSpc>
-                  <a:spcPct val="90000"/>
-                </a:lnSpc>
-                <a:spcBef>
-                  <a:spcPts val="300"/>
-                </a:spcBef>
-                <a:spcAft>
-                  <a:spcPts val="0"/>
-                </a:spcAft>
-                <a:buClr>
-                  <a:schemeClr val="lt1"/>
-                </a:buClr>
-                <a:buSzPts val="1300"/>
-                <a:buFont typeface="Calibri"/>
-                <a:buChar char="•"/>
-              </a:pPr>
-              <a:r>
-                <a:rPr lang="es-MX" sz="1300">
-                  <a:solidFill>
-                    <a:schemeClr val="lt1"/>
-                  </a:solidFill>
-                  <a:latin typeface="Calibri"/>
-                  <a:ea typeface="Calibri"/>
-                  <a:cs typeface="Calibri"/>
-                  <a:sym typeface="Calibri"/>
-                </a:rPr>
-                <a:t>Integración con APIs externas (Gemini API)</a:t>
-              </a:r>
-              <a:endParaRPr sz="1300">
-                <a:solidFill>
-                  <a:schemeClr val="lt1"/>
-                </a:solidFill>
-                <a:latin typeface="Calibri"/>
-                <a:ea typeface="Calibri"/>
-                <a:cs typeface="Calibri"/>
-                <a:sym typeface="Calibri"/>
-              </a:endParaRPr>
-            </a:p>
-            <a:p>
-              <a:pPr indent="-311150" lvl="1" marL="914400" rtl="0" algn="l">
-                <a:lnSpc>
-                  <a:spcPct val="90000"/>
-                </a:lnSpc>
-                <a:spcBef>
-                  <a:spcPts val="300"/>
-                </a:spcBef>
-                <a:spcAft>
-                  <a:spcPts val="0"/>
-                </a:spcAft>
-                <a:buClr>
-                  <a:schemeClr val="lt1"/>
-                </a:buClr>
-                <a:buSzPts val="1300"/>
-                <a:buFont typeface="Calibri"/>
-                <a:buChar char="•"/>
-              </a:pPr>
-              <a:r>
-                <a:rPr lang="es-MX" sz="1300">
-                  <a:solidFill>
-                    <a:schemeClr val="lt1"/>
-                  </a:solidFill>
-                  <a:latin typeface="Calibri"/>
-                  <a:ea typeface="Calibri"/>
-                  <a:cs typeface="Calibri"/>
-                  <a:sym typeface="Calibri"/>
-                </a:rPr>
-                <a:t>Diseño UI/UX e implementación de mockups</a:t>
-              </a:r>
-              <a:endParaRPr sz="1300">
-                <a:solidFill>
-                  <a:schemeClr val="lt1"/>
-                </a:solidFill>
-                <a:latin typeface="Calibri"/>
-                <a:ea typeface="Calibri"/>
-                <a:cs typeface="Calibri"/>
-                <a:sym typeface="Calibri"/>
-              </a:endParaRPr>
-            </a:p>
-            <a:p>
-              <a:pPr indent="-311150" lvl="1" marL="914400" rtl="0" algn="l">
-                <a:lnSpc>
-                  <a:spcPct val="90000"/>
-                </a:lnSpc>
-                <a:spcBef>
-                  <a:spcPts val="300"/>
-                </a:spcBef>
-                <a:spcAft>
-                  <a:spcPts val="0"/>
-                </a:spcAft>
-                <a:buClr>
-                  <a:schemeClr val="lt1"/>
-                </a:buClr>
-                <a:buSzPts val="1300"/>
-                <a:buFont typeface="Calibri"/>
-                <a:buChar char="•"/>
-              </a:pPr>
-              <a:r>
-                <a:rPr lang="es-MX" sz="1300">
-                  <a:solidFill>
-                    <a:schemeClr val="lt1"/>
-                  </a:solidFill>
-                  <a:latin typeface="Calibri"/>
-                  <a:ea typeface="Calibri"/>
-                  <a:cs typeface="Calibri"/>
-                  <a:sym typeface="Calibri"/>
-                </a:rPr>
-                <a:t>Testing y control de calidad frontend</a:t>
-              </a:r>
-              <a:endParaRPr sz="1300">
-                <a:solidFill>
-                  <a:schemeClr val="lt1"/>
-                </a:solidFill>
-                <a:latin typeface="Calibri"/>
-                <a:ea typeface="Calibri"/>
-                <a:cs typeface="Calibri"/>
-                <a:sym typeface="Calibri"/>
-              </a:endParaRPr>
-            </a:p>
-            <a:p>
-              <a:pPr indent="-311150" lvl="1" marL="914400" rtl="0" algn="l">
-                <a:lnSpc>
-                  <a:spcPct val="90000"/>
-                </a:lnSpc>
-                <a:spcBef>
-                  <a:spcPts val="300"/>
-                </a:spcBef>
-                <a:spcAft>
-                  <a:spcPts val="0"/>
-                </a:spcAft>
-                <a:buClr>
-                  <a:schemeClr val="lt1"/>
-                </a:buClr>
-                <a:buSzPts val="1300"/>
-                <a:buFont typeface="Calibri"/>
-                <a:buChar char="•"/>
-              </a:pPr>
-              <a:r>
-                <a:rPr lang="es-MX" sz="1300">
-                  <a:solidFill>
-                    <a:schemeClr val="lt1"/>
-                  </a:solidFill>
-                  <a:latin typeface="Calibri"/>
-                  <a:ea typeface="Calibri"/>
-                  <a:cs typeface="Calibri"/>
-                  <a:sym typeface="Calibri"/>
-                </a:rPr>
-                <a:t>Configuración de monitoreo</a:t>
-              </a:r>
-              <a:endParaRPr sz="1300">
-                <a:solidFill>
-                  <a:schemeClr val="lt1"/>
-                </a:solidFill>
-                <a:latin typeface="Calibri"/>
-                <a:ea typeface="Calibri"/>
-                <a:cs typeface="Calibri"/>
-                <a:sym typeface="Calibri"/>
-              </a:endParaRPr>
-            </a:p>
-            <a:p>
-              <a:pPr indent="-311150" lvl="1" marL="914400" rtl="0" algn="l">
-                <a:lnSpc>
-                  <a:spcPct val="90000"/>
-                </a:lnSpc>
-                <a:spcBef>
-                  <a:spcPts val="300"/>
-                </a:spcBef>
-                <a:spcAft>
-                  <a:spcPts val="0"/>
-                </a:spcAft>
-                <a:buClr>
-                  <a:schemeClr val="lt1"/>
-                </a:buClr>
-                <a:buSzPts val="1300"/>
-                <a:buFont typeface="Calibri"/>
-                <a:buChar char="•"/>
-              </a:pPr>
-              <a:r>
-                <a:rPr lang="es-MX" sz="1300">
-                  <a:solidFill>
-                    <a:schemeClr val="lt1"/>
-                  </a:solidFill>
-                  <a:latin typeface="Calibri"/>
-                  <a:ea typeface="Calibri"/>
-                  <a:cs typeface="Calibri"/>
-                  <a:sym typeface="Calibri"/>
-                </a:rPr>
-                <a:t>Validación del producto</a:t>
-              </a:r>
-              <a:endParaRPr sz="1300">
-                <a:solidFill>
-                  <a:schemeClr val="lt1"/>
-                </a:solidFill>
-                <a:latin typeface="Calibri"/>
-                <a:ea typeface="Calibri"/>
-                <a:cs typeface="Calibri"/>
-                <a:sym typeface="Calibri"/>
-              </a:endParaRPr>
-            </a:p>
-            <a:p>
-              <a:pPr indent="-311150" lvl="1" marL="914400" rtl="0" algn="l">
-                <a:lnSpc>
-                  <a:spcPct val="90000"/>
-                </a:lnSpc>
-                <a:spcBef>
-                  <a:spcPts val="300"/>
-                </a:spcBef>
-                <a:spcAft>
-                  <a:spcPts val="0"/>
-                </a:spcAft>
-                <a:buClr>
-                  <a:schemeClr val="lt1"/>
-                </a:buClr>
-                <a:buSzPts val="1300"/>
-                <a:buFont typeface="Calibri"/>
-                <a:buChar char="•"/>
-              </a:pPr>
-              <a:r>
-                <a:rPr lang="es-MX" sz="1300">
-                  <a:solidFill>
-                    <a:schemeClr val="lt1"/>
-                  </a:solidFill>
-                  <a:latin typeface="Calibri"/>
-                  <a:ea typeface="Calibri"/>
-                  <a:cs typeface="Calibri"/>
-                  <a:sym typeface="Calibri"/>
-                </a:rPr>
-                <a:t>Coordinación de sprints y seguimiento de progreso</a:t>
-              </a:r>
-              <a:endParaRPr sz="1300">
+              <a:endParaRPr sz="1900">
                 <a:solidFill>
                   <a:schemeClr val="lt1"/>
                 </a:solidFill>
@@ -11253,7 +11055,7 @@
                 <a:buNone/>
               </a:pPr>
               <a:r>
-                <a:rPr lang="es-MX" sz="2200">
+                <a:rPr lang="es-MX" sz="2800">
                   <a:solidFill>
                     <a:schemeClr val="lt1"/>
                   </a:solidFill>
@@ -11264,7 +11066,7 @@
                 </a:rPr>
                 <a:t>Vicente Chacón</a:t>
               </a:r>
-              <a:endParaRPr b="0" i="0" sz="2200" u="none" cap="none" strike="noStrike">
+              <a:endParaRPr b="0" i="0" sz="2800" u="none" cap="none" strike="noStrike">
                 <a:solidFill>
                   <a:schemeClr val="lt1"/>
                 </a:solidFill>
@@ -11275,47 +11077,7 @@
               </a:endParaRPr>
             </a:p>
             <a:p>
-              <a:pPr indent="-177800" lvl="1" marL="228600" marR="0" rtl="0" algn="l">
-                <a:lnSpc>
-                  <a:spcPct val="90000"/>
-                </a:lnSpc>
-                <a:spcBef>
-                  <a:spcPts val="910"/>
-                </a:spcBef>
-                <a:spcAft>
-                  <a:spcPts val="0"/>
-                </a:spcAft>
-                <a:buClr>
-                  <a:schemeClr val="lt1"/>
-                </a:buClr>
-                <a:buSzPts val="1200"/>
-                <a:buFont typeface="Calibri"/>
-                <a:buChar char="•"/>
-              </a:pPr>
-              <a:r>
-                <a:rPr lang="es-MX" sz="1200">
-                  <a:solidFill>
-                    <a:schemeClr val="lt1"/>
-                  </a:solidFill>
-                  <a:latin typeface="Calibri"/>
-                  <a:ea typeface="Calibri"/>
-                  <a:cs typeface="Calibri"/>
-                  <a:sym typeface="Calibri"/>
-                </a:rPr>
-                <a:t>Full Stack Developer (Backend Focus)</a:t>
-              </a:r>
-              <a:endParaRPr sz="1200">
-                <a:solidFill>
-                  <a:schemeClr val="lt1"/>
-                </a:solidFill>
-                <a:latin typeface="Calibri"/>
-                <a:ea typeface="Calibri"/>
-                <a:cs typeface="Calibri"/>
-                <a:sym typeface="Calibri"/>
-              </a:endParaRPr>
-            </a:p>
-            <a:p>
-              <a:pPr indent="-304800" lvl="0" marL="457200" rtl="0" algn="l">
+              <a:pPr indent="-342900" lvl="0" marL="457200" rtl="0" algn="l">
                 <a:lnSpc>
                   <a:spcPct val="90000"/>
                 </a:lnSpc>
@@ -11328,12 +11090,12 @@
                 <a:buClr>
                   <a:schemeClr val="lt1"/>
                 </a:buClr>
-                <a:buSzPts val="1200"/>
+                <a:buSzPts val="1800"/>
                 <a:buFont typeface="Calibri"/>
                 <a:buChar char="●"/>
               </a:pPr>
               <a:r>
-                <a:rPr lang="es-MX" sz="1200">
+                <a:rPr lang="es-MX" sz="1800">
                   <a:solidFill>
                     <a:schemeClr val="lt1"/>
                   </a:solidFill>
@@ -11342,9 +11104,9 @@
                   <a:cs typeface="Calibri"/>
                   <a:sym typeface="Calibri"/>
                 </a:rPr>
-                <a:t>Funciones desempeñadas:</a:t>
+                <a:t>Full Stack Developer (Backend Focus)</a:t>
               </a:r>
-              <a:endParaRPr sz="1200">
+              <a:endParaRPr sz="1800">
                 <a:solidFill>
                   <a:schemeClr val="lt1"/>
                 </a:solidFill>
@@ -11355,12 +11117,12 @@
               </a:endParaRPr>
             </a:p>
             <a:p>
-              <a:pPr indent="-304800" lvl="1" marL="914400" rtl="0" algn="l">
+              <a:pPr indent="-342900" lvl="0" marL="457200" rtl="0" algn="l">
                 <a:lnSpc>
                   <a:spcPct val="90000"/>
                 </a:lnSpc>
                 <a:spcBef>
-                  <a:spcPts val="300"/>
+                  <a:spcPts val="0"/>
                 </a:spcBef>
                 <a:spcAft>
                   <a:spcPts val="0"/>
@@ -11368,12 +11130,12 @@
                 <a:buClr>
                   <a:schemeClr val="lt1"/>
                 </a:buClr>
-                <a:buSzPts val="1200"/>
+                <a:buSzPts val="1800"/>
                 <a:buFont typeface="Calibri"/>
-                <a:buChar char="•"/>
+                <a:buChar char="●"/>
               </a:pPr>
               <a:r>
-                <a:rPr lang="es-MX" sz="1200">
+                <a:rPr lang="es-MX" sz="1800">
                   <a:solidFill>
                     <a:schemeClr val="lt1"/>
                   </a:solidFill>
@@ -11382,9 +11144,9 @@
                   <a:cs typeface="Calibri"/>
                   <a:sym typeface="Calibri"/>
                 </a:rPr>
-                <a:t>Arquitectura del sistema backend</a:t>
+                <a:t>Arquitectura backend y diseño de base de datos</a:t>
               </a:r>
-              <a:endParaRPr sz="1200">
+              <a:endParaRPr sz="1800">
                 <a:solidFill>
                   <a:schemeClr val="lt1"/>
                 </a:solidFill>
@@ -11395,12 +11157,12 @@
               </a:endParaRPr>
             </a:p>
             <a:p>
-              <a:pPr indent="-304800" lvl="1" marL="914400" rtl="0" algn="l">
+              <a:pPr indent="-342900" lvl="0" marL="457200" rtl="0" algn="l">
                 <a:lnSpc>
                   <a:spcPct val="90000"/>
                 </a:lnSpc>
                 <a:spcBef>
-                  <a:spcPts val="300"/>
+                  <a:spcPts val="0"/>
                 </a:spcBef>
                 <a:spcAft>
                   <a:spcPts val="0"/>
@@ -11408,12 +11170,12 @@
                 <a:buClr>
                   <a:schemeClr val="lt1"/>
                 </a:buClr>
-                <a:buSzPts val="1200"/>
+                <a:buSzPts val="1800"/>
                 <a:buFont typeface="Calibri"/>
-                <a:buChar char="•"/>
+                <a:buChar char="●"/>
               </a:pPr>
               <a:r>
-                <a:rPr lang="es-MX" sz="1200">
+                <a:rPr lang="es-MX" sz="1800">
                   <a:solidFill>
                     <a:schemeClr val="lt1"/>
                   </a:solidFill>
@@ -11422,9 +11184,9 @@
                   <a:cs typeface="Calibri"/>
                   <a:sym typeface="Calibri"/>
                 </a:rPr>
-                <a:t>Diseño de base de datos</a:t>
+                <a:t>Implementación APIs REST y servicios AWS (Lambda, Cognito, S3)</a:t>
               </a:r>
-              <a:endParaRPr sz="1200">
+              <a:endParaRPr sz="1800">
                 <a:solidFill>
                   <a:schemeClr val="lt1"/>
                 </a:solidFill>
@@ -11435,12 +11197,12 @@
               </a:endParaRPr>
             </a:p>
             <a:p>
-              <a:pPr indent="-304800" lvl="1" marL="914400" rtl="0" algn="l">
+              <a:pPr indent="-342900" lvl="0" marL="457200" rtl="0" algn="l">
                 <a:lnSpc>
                   <a:spcPct val="90000"/>
                 </a:lnSpc>
                 <a:spcBef>
-                  <a:spcPts val="300"/>
+                  <a:spcPts val="0"/>
                 </a:spcBef>
                 <a:spcAft>
                   <a:spcPts val="0"/>
@@ -11448,12 +11210,12 @@
                 <a:buClr>
                   <a:schemeClr val="lt1"/>
                 </a:buClr>
-                <a:buSzPts val="1200"/>
+                <a:buSzPts val="1800"/>
                 <a:buFont typeface="Calibri"/>
-                <a:buChar char="•"/>
+                <a:buChar char="●"/>
               </a:pPr>
               <a:r>
-                <a:rPr lang="es-MX" sz="1200">
+                <a:rPr lang="es-MX" sz="1800">
                   <a:solidFill>
                     <a:schemeClr val="lt1"/>
                   </a:solidFill>
@@ -11462,235 +11224,9 @@
                   <a:cs typeface="Calibri"/>
                   <a:sym typeface="Calibri"/>
                 </a:rPr>
-                <a:t>Implementación de APIs REST y servicios AWS</a:t>
+                <a:t>Gestión de proyecto, documentación técnica y metodología Scrum</a:t>
               </a:r>
-              <a:endParaRPr sz="1200">
-                <a:solidFill>
-                  <a:schemeClr val="lt1"/>
-                </a:solidFill>
-                <a:latin typeface="Calibri"/>
-                <a:ea typeface="Calibri"/>
-                <a:cs typeface="Calibri"/>
-                <a:sym typeface="Calibri"/>
-              </a:endParaRPr>
-            </a:p>
-            <a:p>
-              <a:pPr indent="-304800" lvl="1" marL="914400" rtl="0" algn="l">
-                <a:lnSpc>
-                  <a:spcPct val="90000"/>
-                </a:lnSpc>
-                <a:spcBef>
-                  <a:spcPts val="300"/>
-                </a:spcBef>
-                <a:spcAft>
-                  <a:spcPts val="0"/>
-                </a:spcAft>
-                <a:buClr>
-                  <a:schemeClr val="lt1"/>
-                </a:buClr>
-                <a:buSzPts val="1200"/>
-                <a:buFont typeface="Calibri"/>
-                <a:buChar char="•"/>
-              </a:pPr>
-              <a:r>
-                <a:rPr lang="es-MX" sz="1200">
-                  <a:solidFill>
-                    <a:schemeClr val="lt1"/>
-                  </a:solidFill>
-                  <a:latin typeface="Calibri"/>
-                  <a:ea typeface="Calibri"/>
-                  <a:cs typeface="Calibri"/>
-                  <a:sym typeface="Calibri"/>
-                </a:rPr>
-                <a:t>Configuración de DevOps (AWS Lambda, Cognito, S3)</a:t>
-              </a:r>
-              <a:endParaRPr sz="1200">
-                <a:solidFill>
-                  <a:schemeClr val="lt1"/>
-                </a:solidFill>
-                <a:latin typeface="Calibri"/>
-                <a:ea typeface="Calibri"/>
-                <a:cs typeface="Calibri"/>
-                <a:sym typeface="Calibri"/>
-              </a:endParaRPr>
-            </a:p>
-            <a:p>
-              <a:pPr indent="-304800" lvl="1" marL="914400" rtl="0" algn="l">
-                <a:lnSpc>
-                  <a:spcPct val="90000"/>
-                </a:lnSpc>
-                <a:spcBef>
-                  <a:spcPts val="300"/>
-                </a:spcBef>
-                <a:spcAft>
-                  <a:spcPts val="0"/>
-                </a:spcAft>
-                <a:buClr>
-                  <a:schemeClr val="lt1"/>
-                </a:buClr>
-                <a:buSzPts val="1200"/>
-                <a:buFont typeface="Calibri"/>
-                <a:buChar char="•"/>
-              </a:pPr>
-              <a:r>
-                <a:rPr lang="es-MX" sz="1200">
-                  <a:solidFill>
-                    <a:schemeClr val="lt1"/>
-                  </a:solidFill>
-                  <a:latin typeface="Calibri"/>
-                  <a:ea typeface="Calibri"/>
-                  <a:cs typeface="Calibri"/>
-                  <a:sym typeface="Calibri"/>
-                </a:rPr>
-                <a:t>Gestión del proyecto y documentación técnica</a:t>
-              </a:r>
-              <a:endParaRPr sz="1200">
-                <a:solidFill>
-                  <a:schemeClr val="lt1"/>
-                </a:solidFill>
-                <a:latin typeface="Calibri"/>
-                <a:ea typeface="Calibri"/>
-                <a:cs typeface="Calibri"/>
-                <a:sym typeface="Calibri"/>
-              </a:endParaRPr>
-            </a:p>
-            <a:p>
-              <a:pPr indent="-304800" lvl="1" marL="914400" rtl="0" algn="l">
-                <a:lnSpc>
-                  <a:spcPct val="90000"/>
-                </a:lnSpc>
-                <a:spcBef>
-                  <a:spcPts val="300"/>
-                </a:spcBef>
-                <a:spcAft>
-                  <a:spcPts val="0"/>
-                </a:spcAft>
-                <a:buClr>
-                  <a:schemeClr val="lt1"/>
-                </a:buClr>
-                <a:buSzPts val="1200"/>
-                <a:buFont typeface="Calibri"/>
-                <a:buChar char="•"/>
-              </a:pPr>
-              <a:r>
-                <a:rPr lang="es-MX" sz="1200">
-                  <a:solidFill>
-                    <a:schemeClr val="lt1"/>
-                  </a:solidFill>
-                  <a:latin typeface="Calibri"/>
-                  <a:ea typeface="Calibri"/>
-                  <a:cs typeface="Calibri"/>
-                  <a:sym typeface="Calibri"/>
-                </a:rPr>
-                <a:t>Gestión del proyecto y metodología Scrum</a:t>
-              </a:r>
-              <a:endParaRPr sz="1200">
-                <a:solidFill>
-                  <a:schemeClr val="lt1"/>
-                </a:solidFill>
-                <a:latin typeface="Calibri"/>
-                <a:ea typeface="Calibri"/>
-                <a:cs typeface="Calibri"/>
-                <a:sym typeface="Calibri"/>
-              </a:endParaRPr>
-            </a:p>
-            <a:p>
-              <a:pPr indent="-304800" lvl="1" marL="914400" rtl="0" algn="l">
-                <a:lnSpc>
-                  <a:spcPct val="90000"/>
-                </a:lnSpc>
-                <a:spcBef>
-                  <a:spcPts val="300"/>
-                </a:spcBef>
-                <a:spcAft>
-                  <a:spcPts val="0"/>
-                </a:spcAft>
-                <a:buClr>
-                  <a:schemeClr val="lt1"/>
-                </a:buClr>
-                <a:buSzPts val="1200"/>
-                <a:buFont typeface="Calibri"/>
-                <a:buChar char="•"/>
-              </a:pPr>
-              <a:r>
-                <a:rPr lang="es-MX" sz="1200">
-                  <a:solidFill>
-                    <a:schemeClr val="lt1"/>
-                  </a:solidFill>
-                  <a:latin typeface="Calibri"/>
-                  <a:ea typeface="Calibri"/>
-                  <a:cs typeface="Calibri"/>
-                  <a:sym typeface="Calibri"/>
-                </a:rPr>
-                <a:t>Análisis, requerimientos y documentación de usuario</a:t>
-              </a:r>
-              <a:endParaRPr sz="1200">
-                <a:solidFill>
-                  <a:schemeClr val="lt1"/>
-                </a:solidFill>
-                <a:latin typeface="Calibri"/>
-                <a:ea typeface="Calibri"/>
-                <a:cs typeface="Calibri"/>
-                <a:sym typeface="Calibri"/>
-              </a:endParaRPr>
-            </a:p>
-            <a:p>
-              <a:pPr indent="-304800" lvl="1" marL="914400" rtl="0" algn="l">
-                <a:lnSpc>
-                  <a:spcPct val="90000"/>
-                </a:lnSpc>
-                <a:spcBef>
-                  <a:spcPts val="300"/>
-                </a:spcBef>
-                <a:spcAft>
-                  <a:spcPts val="0"/>
-                </a:spcAft>
-                <a:buClr>
-                  <a:schemeClr val="lt1"/>
-                </a:buClr>
-                <a:buSzPts val="1200"/>
-                <a:buFont typeface="Calibri"/>
-                <a:buChar char="•"/>
-              </a:pPr>
-              <a:r>
-                <a:rPr lang="es-MX" sz="1200">
-                  <a:solidFill>
-                    <a:schemeClr val="lt1"/>
-                  </a:solidFill>
-                  <a:latin typeface="Calibri"/>
-                  <a:ea typeface="Calibri"/>
-                  <a:cs typeface="Calibri"/>
-                  <a:sym typeface="Calibri"/>
-                </a:rPr>
-                <a:t>Pruebas funcionales y testing de usuario final</a:t>
-              </a:r>
-              <a:endParaRPr sz="1200">
-                <a:solidFill>
-                  <a:schemeClr val="lt1"/>
-                </a:solidFill>
-                <a:latin typeface="Calibri"/>
-                <a:ea typeface="Calibri"/>
-                <a:cs typeface="Calibri"/>
-                <a:sym typeface="Calibri"/>
-              </a:endParaRPr>
-            </a:p>
-            <a:p>
-              <a:pPr indent="0" lvl="0" marL="0" rtl="0" algn="l">
-                <a:lnSpc>
-                  <a:spcPct val="90000"/>
-                </a:lnSpc>
-                <a:spcBef>
-                  <a:spcPts val="300"/>
-                </a:spcBef>
-                <a:spcAft>
-                  <a:spcPts val="0"/>
-                </a:spcAft>
-                <a:buNone/>
-              </a:pPr>
-              <a:r>
-                <a:t/>
-              </a:r>
-              <a:endParaRPr sz="1200">
+              <a:endParaRPr sz="1800">
                 <a:solidFill>
                   <a:schemeClr val="lt1"/>
                 </a:solidFill>
@@ -15796,6 +15332,285 @@
 </file>
 
 <file path=ppt/theme/theme1.xml><?xml version="1.0" encoding="utf-8"?>
+<a:theme xmlns:a="http://schemas.openxmlformats.org/drawingml/2006/main" xmlns:r="http://schemas.openxmlformats.org/officeDocument/2006/relationships" name="Streamline">
+  <a:themeElements>
+    <a:clrScheme name="Streamline">
+      <a:dk1>
+        <a:srgbClr val="1A9988"/>
+      </a:dk1>
+      <a:lt1>
+        <a:srgbClr val="FFFFFF"/>
+      </a:lt1>
+      <a:dk2>
+        <a:srgbClr val="1A1A1A"/>
+      </a:dk2>
+      <a:lt2>
+        <a:srgbClr val="E9EDEE"/>
+      </a:lt2>
+      <a:accent1>
+        <a:srgbClr val="595959"/>
+      </a:accent1>
+      <a:accent2>
+        <a:srgbClr val="6AA4C8"/>
+      </a:accent2>
+      <a:accent3>
+        <a:srgbClr val="EB5600"/>
+      </a:accent3>
+      <a:accent4>
+        <a:srgbClr val="A2FFE8"/>
+      </a:accent4>
+      <a:accent5>
+        <a:srgbClr val="1C3678"/>
+      </a:accent5>
+      <a:accent6>
+        <a:srgbClr val="FFB8A2"/>
+      </a:accent6>
+      <a:hlink>
+        <a:srgbClr val="1C3678"/>
+      </a:hlink>
+      <a:folHlink>
+        <a:srgbClr val="1C3678"/>
+      </a:folHlink>
+    </a:clrScheme>
+    <a:fontScheme name="Office">
+      <a:majorFont>
+        <a:latin typeface="Arial"/>
+        <a:ea typeface=""/>
+        <a:cs typeface=""/>
+        <a:font script="Jpan" typeface="ＭＳ Ｐゴシック"/>
+        <a:font script="Hang" typeface="맑은 고딕"/>
+        <a:font script="Hans" typeface="宋体"/>
+        <a:font script="Hant" typeface="新細明體"/>
+        <a:font script="Arab" typeface="Times New Roman"/>
+        <a:font script="Hebr" typeface="Times New Roman"/>
+        <a:font script="Thai" typeface="Angsana New"/>
+        <a:font script="Ethi" typeface="Nyala"/>
+        <a:font script="Beng" typeface="Vrinda"/>
+        <a:font script="Gujr" typeface="Shruti"/>
+        <a:font script="Khmr" typeface="MoolBoran"/>
+        <a:font script="Knda" typeface="Tunga"/>
+        <a:font script="Guru" typeface="Raavi"/>
+        <a:font script="Cans" typeface="Euphemia"/>
+        <a:font script="Cher" typeface="Plantagenet Cherokee"/>
+        <a:font script="Yiii" typeface="Microsoft Yi Baiti"/>
+        <a:font script="Tibt" typeface="Microsoft Himalaya"/>
+        <a:font script="Thaa" typeface="MV Boli"/>
+        <a:font script="Deva" typeface="Mangal"/>
+        <a:font script="Telu" typeface="Gautami"/>
+        <a:font script="Taml" typeface="Latha"/>
+        <a:font script="Syrc" typeface="Estrangelo Edessa"/>
+        <a:font script="Orya" typeface="Kalinga"/>
+        <a:font script="Mlym" typeface="Kartika"/>
+        <a:font script="Laoo" typeface="DokChampa"/>
+        <a:font script="Sinh" typeface="Iskoola Pota"/>
+        <a:font script="Mong" typeface="Mongolian Baiti"/>
+        <a:font script="Viet" typeface="Times New Roman"/>
+        <a:font script="Uigh" typeface="Microsoft Uighur"/>
+        <a:font script="Geor" typeface="Sylfaen"/>
+      </a:majorFont>
+      <a:minorFont>
+        <a:latin typeface="Arial"/>
+        <a:ea typeface=""/>
+        <a:cs typeface=""/>
+        <a:font script="Jpan" typeface="ＭＳ Ｐゴシック"/>
+        <a:font script="Hang" typeface="맑은 고딕"/>
+        <a:font script="Hans" typeface="宋体"/>
+        <a:font script="Hant" typeface="新細明體"/>
+        <a:font script="Arab" typeface="Arial"/>
+        <a:font script="Hebr" typeface="Arial"/>
+        <a:font script="Thai" typeface="Cordia New"/>
+        <a:font script="Ethi" typeface="Nyala"/>
+        <a:font script="Beng" typeface="Vrinda"/>
+        <a:font script="Gujr" typeface="Shruti"/>
+        <a:font script="Khmr" typeface="DaunPenh"/>
+        <a:font script="Knda" typeface="Tunga"/>
+        <a:font script="Guru" typeface="Raavi"/>
+        <a:font script="Cans" typeface="Euphemia"/>
+        <a:font script="Cher" typeface="Plantagenet Cherokee"/>
+        <a:font script="Yiii" typeface="Microsoft Yi Baiti"/>
+        <a:font script="Tibt" typeface="Microsoft Himalaya"/>
+        <a:font script="Thaa" typeface="MV Boli"/>
+        <a:font script="Deva" typeface="Mangal"/>
+        <a:font script="Telu" typeface="Gautami"/>
+        <a:font script="Taml" typeface="Latha"/>
+        <a:font script="Syrc" typeface="Estrangelo Edessa"/>
+        <a:font script="Orya" typeface="Kalinga"/>
+        <a:font script="Mlym" typeface="Kartika"/>
+        <a:font script="Laoo" typeface="DokChampa"/>
+        <a:font script="Sinh" typeface="Iskoola Pota"/>
+        <a:font script="Mong" typeface="Mongolian Baiti"/>
+        <a:font script="Viet" typeface="Arial"/>
+        <a:font script="Uigh" typeface="Microsoft Uighur"/>
+        <a:font script="Geor" typeface="Sylfaen"/>
+      </a:minorFont>
+    </a:fontScheme>
+    <a:fmtScheme name="Office">
+      <a:fillStyleLst>
+        <a:solidFill>
+          <a:schemeClr val="phClr"/>
+        </a:solidFill>
+        <a:gradFill rotWithShape="1">
+          <a:gsLst>
+            <a:gs pos="0">
+              <a:schemeClr val="phClr">
+                <a:tint val="50000"/>
+                <a:satMod val="300000"/>
+              </a:schemeClr>
+            </a:gs>
+            <a:gs pos="35000">
+              <a:schemeClr val="phClr">
+                <a:tint val="37000"/>
+                <a:satMod val="300000"/>
+              </a:schemeClr>
+            </a:gs>
+            <a:gs pos="100000">
+              <a:schemeClr val="phClr">
+                <a:tint val="15000"/>
+                <a:satMod val="350000"/>
+              </a:schemeClr>
+            </a:gs>
+          </a:gsLst>
+          <a:lin ang="16200000" scaled="1"/>
+        </a:gradFill>
+        <a:gradFill rotWithShape="1">
+          <a:gsLst>
+            <a:gs pos="0">
+              <a:schemeClr val="phClr">
+                <a:tint val="100000"/>
+                <a:shade val="100000"/>
+                <a:satMod val="130000"/>
+              </a:schemeClr>
+            </a:gs>
+            <a:gs pos="100000">
+              <a:schemeClr val="phClr">
+                <a:tint val="50000"/>
+                <a:shade val="100000"/>
+                <a:satMod val="350000"/>
+              </a:schemeClr>
+            </a:gs>
+          </a:gsLst>
+          <a:lin ang="16200000" scaled="0"/>
+        </a:gradFill>
+      </a:fillStyleLst>
+      <a:lnStyleLst>
+        <a:ln w="9525" cap="flat" cmpd="sng" algn="ctr">
+          <a:solidFill>
+            <a:schemeClr val="phClr">
+              <a:shade val="95000"/>
+              <a:satMod val="105000"/>
+            </a:schemeClr>
+          </a:solidFill>
+          <a:prstDash val="solid"/>
+        </a:ln>
+        <a:ln w="25400" cap="flat" cmpd="sng" algn="ctr">
+          <a:solidFill>
+            <a:schemeClr val="phClr"/>
+          </a:solidFill>
+          <a:prstDash val="solid"/>
+        </a:ln>
+        <a:ln w="38100" cap="flat" cmpd="sng" algn="ctr">
+          <a:solidFill>
+            <a:schemeClr val="phClr"/>
+          </a:solidFill>
+          <a:prstDash val="solid"/>
+        </a:ln>
+      </a:lnStyleLst>
+      <a:effectStyleLst>
+        <a:effectStyle>
+          <a:effectLst>
+            <a:outerShdw blurRad="40000" dist="20000" dir="5400000" rotWithShape="0">
+              <a:srgbClr val="000000">
+                <a:alpha val="38000"/>
+              </a:srgbClr>
+            </a:outerShdw>
+          </a:effectLst>
+        </a:effectStyle>
+        <a:effectStyle>
+          <a:effectLst>
+            <a:outerShdw blurRad="40000" dist="23000" dir="5400000" rotWithShape="0">
+              <a:srgbClr val="000000">
+                <a:alpha val="35000"/>
+              </a:srgbClr>
+            </a:outerShdw>
+          </a:effectLst>
+        </a:effectStyle>
+        <a:effectStyle>
+          <a:effectLst>
+            <a:outerShdw blurRad="40000" dist="23000" dir="5400000" rotWithShape="0">
+              <a:srgbClr val="000000">
+                <a:alpha val="35000"/>
+              </a:srgbClr>
+            </a:outerShdw>
+          </a:effectLst>
+          <a:scene3d>
+            <a:camera prst="orthographicFront">
+              <a:rot lat="0" lon="0" rev="0"/>
+            </a:camera>
+            <a:lightRig rig="threePt" dir="t">
+              <a:rot lat="0" lon="0" rev="1200000"/>
+            </a:lightRig>
+          </a:scene3d>
+          <a:sp3d>
+            <a:bevelT w="63500" h="25400"/>
+          </a:sp3d>
+        </a:effectStyle>
+      </a:effectStyleLst>
+      <a:bgFillStyleLst>
+        <a:solidFill>
+          <a:schemeClr val="phClr"/>
+        </a:solidFill>
+        <a:gradFill rotWithShape="1">
+          <a:gsLst>
+            <a:gs pos="0">
+              <a:schemeClr val="phClr">
+                <a:tint val="40000"/>
+                <a:satMod val="350000"/>
+              </a:schemeClr>
+            </a:gs>
+            <a:gs pos="40000">
+              <a:schemeClr val="phClr">
+                <a:tint val="45000"/>
+                <a:shade val="99000"/>
+                <a:satMod val="350000"/>
+              </a:schemeClr>
+            </a:gs>
+            <a:gs pos="100000">
+              <a:schemeClr val="phClr">
+                <a:shade val="20000"/>
+                <a:satMod val="255000"/>
+              </a:schemeClr>
+            </a:gs>
+          </a:gsLst>
+          <a:path path="circle">
+            <a:fillToRect l="50000" t="-80000" r="50000" b="180000"/>
+          </a:path>
+        </a:gradFill>
+        <a:gradFill rotWithShape="1">
+          <a:gsLst>
+            <a:gs pos="0">
+              <a:schemeClr val="phClr">
+                <a:tint val="80000"/>
+                <a:satMod val="300000"/>
+              </a:schemeClr>
+            </a:gs>
+            <a:gs pos="100000">
+              <a:schemeClr val="phClr">
+                <a:shade val="30000"/>
+                <a:satMod val="200000"/>
+              </a:schemeClr>
+            </a:gs>
+          </a:gsLst>
+          <a:path path="circle">
+            <a:fillToRect l="50000" t="50000" r="50000" b="50000"/>
+          </a:path>
+        </a:gradFill>
+      </a:bgFillStyleLst>
+    </a:fmtScheme>
+  </a:themeElements>
+</a:theme>
+</file>
+
+<file path=ppt/theme/theme2.xml><?xml version="1.0" encoding="utf-8"?>
 <a:theme xmlns:a="http://schemas.openxmlformats.org/drawingml/2006/main" xmlns:r="http://schemas.openxmlformats.org/officeDocument/2006/relationships">
   <a:themeElements>
     <a:clrScheme name="Default">
@@ -16072,283 +15887,4 @@
     </a:fmtScheme>
   </a:themeElements>
 </a:theme>
-</file>
-
-<file path=ppt/theme/theme2.xml><?xml version="1.0" encoding="utf-8"?>
-<a:theme xmlns:a="http://schemas.openxmlformats.org/drawingml/2006/main" xmlns:r="http://schemas.openxmlformats.org/officeDocument/2006/relationships" name="Streamline">
-  <a:themeElements>
-    <a:clrScheme name="Streamline">
-      <a:dk1>
-        <a:srgbClr val="1A9988"/>
-      </a:dk1>
-      <a:lt1>
-        <a:srgbClr val="FFFFFF"/>
-      </a:lt1>
-      <a:dk2>
-        <a:srgbClr val="1A1A1A"/>
-      </a:dk2>
-      <a:lt2>
-        <a:srgbClr val="E9EDEE"/>
-      </a:lt2>
-      <a:accent1>
-        <a:srgbClr val="595959"/>
-      </a:accent1>
-      <a:accent2>
-        <a:srgbClr val="6AA4C8"/>
-      </a:accent2>
-      <a:accent3>
-        <a:srgbClr val="EB5600"/>
-      </a:accent3>
-      <a:accent4>
-        <a:srgbClr val="A2FFE8"/>
-      </a:accent4>
-      <a:accent5>
-        <a:srgbClr val="1C3678"/>
-      </a:accent5>
-      <a:accent6>
-        <a:srgbClr val="FFB8A2"/>
-      </a:accent6>
-      <a:hlink>
-        <a:srgbClr val="1C3678"/>
-      </a:hlink>
-      <a:folHlink>
-        <a:srgbClr val="1C3678"/>
-      </a:folHlink>
-    </a:clrScheme>
-    <a:fontScheme name="Office">
-      <a:majorFont>
-        <a:latin typeface="Arial"/>
-        <a:ea typeface=""/>
-        <a:cs typeface=""/>
-        <a:font script="Jpan" typeface="ＭＳ Ｐゴシック"/>
-        <a:font script="Hang" typeface="맑은 고딕"/>
-        <a:font script="Hans" typeface="宋体"/>
-        <a:font script="Hant" typeface="新細明體"/>
-        <a:font script="Arab" typeface="Times New Roman"/>
-        <a:font script="Hebr" typeface="Times New Roman"/>
-        <a:font script="Thai" typeface="Angsana New"/>
-        <a:font script="Ethi" typeface="Nyala"/>
-        <a:font script="Beng" typeface="Vrinda"/>
-        <a:font script="Gujr" typeface="Shruti"/>
-        <a:font script="Khmr" typeface="MoolBoran"/>
-        <a:font script="Knda" typeface="Tunga"/>
-        <a:font script="Guru" typeface="Raavi"/>
-        <a:font script="Cans" typeface="Euphemia"/>
-        <a:font script="Cher" typeface="Plantagenet Cherokee"/>
-        <a:font script="Yiii" typeface="Microsoft Yi Baiti"/>
-        <a:font script="Tibt" typeface="Microsoft Himalaya"/>
-        <a:font script="Thaa" typeface="MV Boli"/>
-        <a:font script="Deva" typeface="Mangal"/>
-        <a:font script="Telu" typeface="Gautami"/>
-        <a:font script="Taml" typeface="Latha"/>
-        <a:font script="Syrc" typeface="Estrangelo Edessa"/>
-        <a:font script="Orya" typeface="Kalinga"/>
-        <a:font script="Mlym" typeface="Kartika"/>
-        <a:font script="Laoo" typeface="DokChampa"/>
-        <a:font script="Sinh" typeface="Iskoola Pota"/>
-        <a:font script="Mong" typeface="Mongolian Baiti"/>
-        <a:font script="Viet" typeface="Times New Roman"/>
-        <a:font script="Uigh" typeface="Microsoft Uighur"/>
-        <a:font script="Geor" typeface="Sylfaen"/>
-      </a:majorFont>
-      <a:minorFont>
-        <a:latin typeface="Arial"/>
-        <a:ea typeface=""/>
-        <a:cs typeface=""/>
-        <a:font script="Jpan" typeface="ＭＳ Ｐゴシック"/>
-        <a:font script="Hang" typeface="맑은 고딕"/>
-        <a:font script="Hans" typeface="宋体"/>
-        <a:font script="Hant" typeface="新細明體"/>
-        <a:font script="Arab" typeface="Arial"/>
-        <a:font script="Hebr" typeface="Arial"/>
-        <a:font script="Thai" typeface="Cordia New"/>
-        <a:font script="Ethi" typeface="Nyala"/>
-        <a:font script="Beng" typeface="Vrinda"/>
-        <a:font script="Gujr" typeface="Shruti"/>
-        <a:font script="Khmr" typeface="DaunPenh"/>
-        <a:font script="Knda" typeface="Tunga"/>
-        <a:font script="Guru" typeface="Raavi"/>
-        <a:font script="Cans" typeface="Euphemia"/>
-        <a:font script="Cher" typeface="Plantagenet Cherokee"/>
-        <a:font script="Yiii" typeface="Microsoft Yi Baiti"/>
-        <a:font script="Tibt" typeface="Microsoft Himalaya"/>
-        <a:font script="Thaa" typeface="MV Boli"/>
-        <a:font script="Deva" typeface="Mangal"/>
-        <a:font script="Telu" typeface="Gautami"/>
-        <a:font script="Taml" typeface="Latha"/>
-        <a:font script="Syrc" typeface="Estrangelo Edessa"/>
-        <a:font script="Orya" typeface="Kalinga"/>
-        <a:font script="Mlym" typeface="Kartika"/>
-        <a:font script="Laoo" typeface="DokChampa"/>
-        <a:font script="Sinh" typeface="Iskoola Pota"/>
-        <a:font script="Mong" typeface="Mongolian Baiti"/>
-        <a:font script="Viet" typeface="Arial"/>
-        <a:font script="Uigh" typeface="Microsoft Uighur"/>
-        <a:font script="Geor" typeface="Sylfaen"/>
-      </a:minorFont>
-    </a:fontScheme>
-    <a:fmtScheme name="Office">
-      <a:fillStyleLst>
-        <a:solidFill>
-          <a:schemeClr val="phClr"/>
-        </a:solidFill>
-        <a:gradFill rotWithShape="1">
-          <a:gsLst>
-            <a:gs pos="0">
-              <a:schemeClr val="phClr">
-                <a:tint val="50000"/>
-                <a:satMod val="300000"/>
-              </a:schemeClr>
-            </a:gs>
-            <a:gs pos="35000">
-              <a:schemeClr val="phClr">
-                <a:tint val="37000"/>
-                <a:satMod val="300000"/>
-              </a:schemeClr>
-            </a:gs>
-            <a:gs pos="100000">
-              <a:schemeClr val="phClr">
-                <a:tint val="15000"/>
-                <a:satMod val="350000"/>
-              </a:schemeClr>
-            </a:gs>
-          </a:gsLst>
-          <a:lin ang="16200000" scaled="1"/>
-        </a:gradFill>
-        <a:gradFill rotWithShape="1">
-          <a:gsLst>
-            <a:gs pos="0">
-              <a:schemeClr val="phClr">
-                <a:tint val="100000"/>
-                <a:shade val="100000"/>
-                <a:satMod val="130000"/>
-              </a:schemeClr>
-            </a:gs>
-            <a:gs pos="100000">
-              <a:schemeClr val="phClr">
-                <a:tint val="50000"/>
-                <a:shade val="100000"/>
-                <a:satMod val="350000"/>
-              </a:schemeClr>
-            </a:gs>
-          </a:gsLst>
-          <a:lin ang="16200000" scaled="0"/>
-        </a:gradFill>
-      </a:fillStyleLst>
-      <a:lnStyleLst>
-        <a:ln w="9525" cap="flat" cmpd="sng" algn="ctr">
-          <a:solidFill>
-            <a:schemeClr val="phClr">
-              <a:shade val="95000"/>
-              <a:satMod val="105000"/>
-            </a:schemeClr>
-          </a:solidFill>
-          <a:prstDash val="solid"/>
-        </a:ln>
-        <a:ln w="25400" cap="flat" cmpd="sng" algn="ctr">
-          <a:solidFill>
-            <a:schemeClr val="phClr"/>
-          </a:solidFill>
-          <a:prstDash val="solid"/>
-        </a:ln>
-        <a:ln w="38100" cap="flat" cmpd="sng" algn="ctr">
-          <a:solidFill>
-            <a:schemeClr val="phClr"/>
-          </a:solidFill>
-          <a:prstDash val="solid"/>
-        </a:ln>
-      </a:lnStyleLst>
-      <a:effectStyleLst>
-        <a:effectStyle>
-          <a:effectLst>
-            <a:outerShdw blurRad="40000" dist="20000" dir="5400000" rotWithShape="0">
-              <a:srgbClr val="000000">
-                <a:alpha val="38000"/>
-              </a:srgbClr>
-            </a:outerShdw>
-          </a:effectLst>
-        </a:effectStyle>
-        <a:effectStyle>
-          <a:effectLst>
-            <a:outerShdw blurRad="40000" dist="23000" dir="5400000" rotWithShape="0">
-              <a:srgbClr val="000000">
-                <a:alpha val="35000"/>
-              </a:srgbClr>
-            </a:outerShdw>
-          </a:effectLst>
-        </a:effectStyle>
-        <a:effectStyle>
-          <a:effectLst>
-            <a:outerShdw blurRad="40000" dist="23000" dir="5400000" rotWithShape="0">
-              <a:srgbClr val="000000">
-                <a:alpha val="35000"/>
-              </a:srgbClr>
-            </a:outerShdw>
-          </a:effectLst>
-          <a:scene3d>
-            <a:camera prst="orthographicFront">
-              <a:rot lat="0" lon="0" rev="0"/>
-            </a:camera>
-            <a:lightRig rig="threePt" dir="t">
-              <a:rot lat="0" lon="0" rev="1200000"/>
-            </a:lightRig>
-          </a:scene3d>
-          <a:sp3d>
-            <a:bevelT w="63500" h="25400"/>
-          </a:sp3d>
-        </a:effectStyle>
-      </a:effectStyleLst>
-      <a:bgFillStyleLst>
-        <a:solidFill>
-          <a:schemeClr val="phClr"/>
-        </a:solidFill>
-        <a:gradFill rotWithShape="1">
-          <a:gsLst>
-            <a:gs pos="0">
-              <a:schemeClr val="phClr">
-                <a:tint val="40000"/>
-                <a:satMod val="350000"/>
-              </a:schemeClr>
-            </a:gs>
-            <a:gs pos="40000">
-              <a:schemeClr val="phClr">
-                <a:tint val="45000"/>
-                <a:shade val="99000"/>
-                <a:satMod val="350000"/>
-              </a:schemeClr>
-            </a:gs>
-            <a:gs pos="100000">
-              <a:schemeClr val="phClr">
-                <a:shade val="20000"/>
-                <a:satMod val="255000"/>
-              </a:schemeClr>
-            </a:gs>
-          </a:gsLst>
-          <a:path path="circle">
-            <a:fillToRect l="50000" t="-80000" r="50000" b="180000"/>
-          </a:path>
-        </a:gradFill>
-        <a:gradFill rotWithShape="1">
-          <a:gsLst>
-            <a:gs pos="0">
-              <a:schemeClr val="phClr">
-                <a:tint val="80000"/>
-                <a:satMod val="300000"/>
-              </a:schemeClr>
-            </a:gs>
-            <a:gs pos="100000">
-              <a:schemeClr val="phClr">
-                <a:shade val="30000"/>
-                <a:satMod val="200000"/>
-              </a:schemeClr>
-            </a:gs>
-          </a:gsLst>
-          <a:path path="circle">
-            <a:fillToRect l="50000" t="50000" r="50000" b="50000"/>
-          </a:path>
-        </a:gradFill>
-      </a:bgFillStyleLst>
-    </a:fmtScheme>
-  </a:themeElements>
-</a:theme>
 </file>
</xml_diff>